<commit_message>
Màj Projet UML FINAL
</commit_message>
<xml_diff>
--- a/UML/PROJET UML FINAL.pptx
+++ b/UML/PROJET UML FINAL.pptx
@@ -427,7 +427,7 @@
             <a:fld id="{55FB7768-240E-4BDC-A263-F6420B131AE6}" type="datetimeFigureOut">
               <a:rPr lang="fr-FR" smtClean="0"/>
               <a:pPr/>
-              <a:t>08/07/2014</a:t>
+              <a:t>09/07/2014</a:t>
             </a:fld>
             <a:endParaRPr lang="fr-FR"/>
           </a:p>
@@ -614,7 +614,7 @@
             <a:fld id="{55FB7768-240E-4BDC-A263-F6420B131AE6}" type="datetimeFigureOut">
               <a:rPr lang="fr-FR" smtClean="0"/>
               <a:pPr/>
-              <a:t>08/07/2014</a:t>
+              <a:t>09/07/2014</a:t>
             </a:fld>
             <a:endParaRPr lang="fr-FR"/>
           </a:p>
@@ -801,7 +801,7 @@
             <a:fld id="{55FB7768-240E-4BDC-A263-F6420B131AE6}" type="datetimeFigureOut">
               <a:rPr lang="fr-FR" smtClean="0"/>
               <a:pPr/>
-              <a:t>08/07/2014</a:t>
+              <a:t>09/07/2014</a:t>
             </a:fld>
             <a:endParaRPr lang="fr-FR"/>
           </a:p>
@@ -988,7 +988,7 @@
             <a:fld id="{55FB7768-240E-4BDC-A263-F6420B131AE6}" type="datetimeFigureOut">
               <a:rPr lang="fr-FR" smtClean="0"/>
               <a:pPr/>
-              <a:t>08/07/2014</a:t>
+              <a:t>09/07/2014</a:t>
             </a:fld>
             <a:endParaRPr lang="fr-FR"/>
           </a:p>
@@ -1371,7 +1371,7 @@
             <a:fld id="{55FB7768-240E-4BDC-A263-F6420B131AE6}" type="datetimeFigureOut">
               <a:rPr lang="fr-FR" smtClean="0"/>
               <a:pPr/>
-              <a:t>08/07/2014</a:t>
+              <a:t>09/07/2014</a:t>
             </a:fld>
             <a:endParaRPr lang="fr-FR"/>
           </a:p>
@@ -1642,7 +1642,7 @@
             <a:fld id="{55FB7768-240E-4BDC-A263-F6420B131AE6}" type="datetimeFigureOut">
               <a:rPr lang="fr-FR" smtClean="0"/>
               <a:pPr/>
-              <a:t>08/07/2014</a:t>
+              <a:t>09/07/2014</a:t>
             </a:fld>
             <a:endParaRPr lang="fr-FR"/>
           </a:p>
@@ -2029,7 +2029,7 @@
             <a:fld id="{55FB7768-240E-4BDC-A263-F6420B131AE6}" type="datetimeFigureOut">
               <a:rPr lang="fr-FR" smtClean="0"/>
               <a:pPr/>
-              <a:t>08/07/2014</a:t>
+              <a:t>09/07/2014</a:t>
             </a:fld>
             <a:endParaRPr lang="fr-FR"/>
           </a:p>
@@ -2152,7 +2152,7 @@
             <a:fld id="{55FB7768-240E-4BDC-A263-F6420B131AE6}" type="datetimeFigureOut">
               <a:rPr lang="fr-FR" smtClean="0"/>
               <a:pPr/>
-              <a:t>08/07/2014</a:t>
+              <a:t>09/07/2014</a:t>
             </a:fld>
             <a:endParaRPr lang="fr-FR"/>
           </a:p>
@@ -2334,7 +2334,7 @@
             <a:fld id="{55FB7768-240E-4BDC-A263-F6420B131AE6}" type="datetimeFigureOut">
               <a:rPr lang="fr-FR" smtClean="0"/>
               <a:pPr/>
-              <a:t>08/07/2014</a:t>
+              <a:t>09/07/2014</a:t>
             </a:fld>
             <a:endParaRPr lang="fr-FR"/>
           </a:p>
@@ -2670,7 +2670,7 @@
             <a:fld id="{55FB7768-240E-4BDC-A263-F6420B131AE6}" type="datetimeFigureOut">
               <a:rPr lang="fr-FR" smtClean="0"/>
               <a:pPr/>
-              <a:t>08/07/2014</a:t>
+              <a:t>09/07/2014</a:t>
             </a:fld>
             <a:endParaRPr lang="fr-FR"/>
           </a:p>
@@ -3041,7 +3041,7 @@
             <a:fld id="{55FB7768-240E-4BDC-A263-F6420B131AE6}" type="datetimeFigureOut">
               <a:rPr lang="fr-FR" smtClean="0"/>
               <a:pPr/>
-              <a:t>08/07/2014</a:t>
+              <a:t>09/07/2014</a:t>
             </a:fld>
             <a:endParaRPr lang="fr-FR"/>
           </a:p>
@@ -3461,7 +3461,7 @@
             <a:fld id="{55FB7768-240E-4BDC-A263-F6420B131AE6}" type="datetimeFigureOut">
               <a:rPr lang="fr-FR" smtClean="0"/>
               <a:pPr/>
-              <a:t>08/07/2014</a:t>
+              <a:t>09/07/2014</a:t>
             </a:fld>
             <a:endParaRPr lang="fr-FR"/>
           </a:p>
@@ -3968,14 +3968,6 @@
               </a:rPr>
               <a:t>Ivan KLARMAN – Walson RENE – </a:t>
             </a:r>
-            <a:endParaRPr lang="fr-FR" sz="2400" dirty="0" smtClean="0">
-              <a:solidFill>
-                <a:schemeClr val="tx1">
-                  <a:lumMod val="75000"/>
-                  <a:lumOff val="25000"/>
-                </a:schemeClr>
-              </a:solidFill>
-            </a:endParaRPr>
           </a:p>
           <a:p>
             <a:r>
@@ -3987,18 +3979,7 @@
                   </a:schemeClr>
                 </a:solidFill>
               </a:rPr>
-              <a:t>Quentin </a:t>
-            </a:r>
-            <a:r>
-              <a:rPr lang="fr-FR" sz="2400" dirty="0" smtClean="0">
-                <a:solidFill>
-                  <a:schemeClr val="tx1">
-                    <a:lumMod val="75000"/>
-                    <a:lumOff val="25000"/>
-                  </a:schemeClr>
-                </a:solidFill>
-              </a:rPr>
-              <a:t>TOUATIOUI</a:t>
+              <a:t>Quentin TOUATIOUI</a:t>
             </a:r>
           </a:p>
           <a:p>
@@ -4078,8 +4059,18 @@
           <a:p>
             <a:r>
               <a:rPr lang="fr-FR" dirty="0" smtClean="0"/>
-              <a:t>2) Diagramme de séquence</a:t>
-            </a:r>
+              <a:t>2) Diagramme de </a:t>
+            </a:r>
+            <a:r>
+              <a:rPr lang="fr-FR" dirty="0" smtClean="0"/>
+              <a:t>séquence</a:t>
+            </a:r>
+          </a:p>
+          <a:p>
+            <a:pPr>
+              <a:buNone/>
+            </a:pPr>
+            <a:endParaRPr lang="fr-FR" dirty="0" smtClean="0"/>
           </a:p>
           <a:p>
             <a:pPr>
@@ -4089,6 +4080,32 @@
           </a:p>
         </p:txBody>
       </p:sp>
+      <p:pic>
+        <p:nvPicPr>
+          <p:cNvPr id="1026" name="Picture 2" descr="F:\UML\DiagrammedeSequence.png"/>
+          <p:cNvPicPr>
+            <a:picLocks noChangeAspect="1" noChangeArrowheads="1"/>
+          </p:cNvPicPr>
+          <p:nvPr/>
+        </p:nvPicPr>
+        <p:blipFill>
+          <a:blip r:embed="rId2" cstate="print"/>
+          <a:srcRect/>
+          <a:stretch>
+            <a:fillRect/>
+          </a:stretch>
+        </p:blipFill>
+        <p:spPr bwMode="auto">
+          <a:xfrm>
+            <a:off x="0" y="1124744"/>
+            <a:ext cx="9144000" cy="5049941"/>
+          </a:xfrm>
+          <a:prstGeom prst="rect">
+            <a:avLst/>
+          </a:prstGeom>
+          <a:noFill/>
+        </p:spPr>
+      </p:pic>
     </p:spTree>
   </p:cSld>
   <p:clrMapOvr>

</xml_diff>